<commit_message>
Updating the SlickNav slide to call ready the recommended way.
</commit_message>
<xml_diff>
--- a/murach_html_4e/slides/Chapter 8 slides (Revised).pptx
+++ b/murach_html_4e/slides/Chapter 8 slides (Revised).pptx
@@ -375,7 +375,7 @@
               <a:pPr>
                 <a:defRPr/>
               </a:pPr>
-              <a:t>6/17/2019</a:t>
+              <a:t>6/18/2019</a:t>
             </a:fld>
             <a:endParaRPr lang="en-US"/>
           </a:p>
@@ -14901,7 +14901,200 @@
                 <a:ea typeface="Times New Roman" panose="02020603050405020304" pitchFamily="18" charset="0"/>
                 <a:cs typeface="Times New Roman" panose="02020603050405020304" pitchFamily="18" charset="0"/>
               </a:rPr>
-              <a:t>    $(document).ready(function(){</a:t>
+              <a:t>    </a:t>
+            </a:r>
+            <a:r>
+              <a:rPr lang="en-US" sz="1400" b="1" dirty="0">
+                <a:highlight>
+                  <a:srgbClr val="FFFF00"/>
+                </a:highlight>
+                <a:latin typeface="Courier New" panose="02070309020205020404" pitchFamily="49" charset="0"/>
+                <a:ea typeface="Times New Roman" panose="02020603050405020304" pitchFamily="18" charset="0"/>
+                <a:cs typeface="Times New Roman" panose="02020603050405020304" pitchFamily="18" charset="0"/>
+              </a:rPr>
+              <a:t>$(function() {</a:t>
+            </a:r>
+          </a:p>
+          <a:p>
+            <a:pPr marL="347345" marR="0">
+              <a:spcBef>
+                <a:spcPts val="0"/>
+              </a:spcBef>
+              <a:spcAft>
+                <a:spcPts val="0"/>
+              </a:spcAft>
+              <a:tabLst>
+                <a:tab pos="1371600" algn="l"/>
+              </a:tabLst>
+            </a:pPr>
+            <a:r>
+              <a:rPr lang="en-US" sz="1400" b="1" dirty="0">
+                <a:highlight>
+                  <a:srgbClr val="FFFFFF"/>
+                </a:highlight>
+                <a:latin typeface="Courier New" panose="02070309020205020404" pitchFamily="49" charset="0"/>
+                <a:ea typeface="Times New Roman" panose="02020603050405020304" pitchFamily="18" charset="0"/>
+                <a:cs typeface="Times New Roman" panose="02020603050405020304" pitchFamily="18" charset="0"/>
+              </a:rPr>
+              <a:t>    </a:t>
+            </a:r>
+            <a:r>
+              <a:rPr lang="en-US" sz="1400" b="1" dirty="0">
+                <a:highlight>
+                  <a:srgbClr val="FFFF00"/>
+                </a:highlight>
+                <a:latin typeface="Courier New" panose="02070309020205020404" pitchFamily="49" charset="0"/>
+                <a:ea typeface="Times New Roman" panose="02020603050405020304" pitchFamily="18" charset="0"/>
+                <a:cs typeface="Times New Roman" panose="02020603050405020304" pitchFamily="18" charset="0"/>
+              </a:rPr>
+              <a:t>    $('#</a:t>
+            </a:r>
+            <a:r>
+              <a:rPr lang="en-US" sz="1400" b="1" dirty="0" err="1">
+                <a:highlight>
+                  <a:srgbClr val="FFFF00"/>
+                </a:highlight>
+                <a:latin typeface="Courier New" panose="02070309020205020404" pitchFamily="49" charset="0"/>
+                <a:ea typeface="Times New Roman" panose="02020603050405020304" pitchFamily="18" charset="0"/>
+                <a:cs typeface="Times New Roman" panose="02020603050405020304" pitchFamily="18" charset="0"/>
+              </a:rPr>
+              <a:t>nav_menu</a:t>
+            </a:r>
+            <a:r>
+              <a:rPr lang="en-US" sz="1400" b="1" dirty="0">
+                <a:highlight>
+                  <a:srgbClr val="FFFF00"/>
+                </a:highlight>
+                <a:latin typeface="Courier New" panose="02070309020205020404" pitchFamily="49" charset="0"/>
+                <a:ea typeface="Times New Roman" panose="02020603050405020304" pitchFamily="18" charset="0"/>
+                <a:cs typeface="Times New Roman" panose="02020603050405020304" pitchFamily="18" charset="0"/>
+              </a:rPr>
+              <a:t>').</a:t>
+            </a:r>
+            <a:r>
+              <a:rPr lang="en-US" sz="1400" b="1" dirty="0" err="1">
+                <a:highlight>
+                  <a:srgbClr val="FFFF00"/>
+                </a:highlight>
+                <a:latin typeface="Courier New" panose="02070309020205020404" pitchFamily="49" charset="0"/>
+                <a:ea typeface="Times New Roman" panose="02020603050405020304" pitchFamily="18" charset="0"/>
+                <a:cs typeface="Times New Roman" panose="02020603050405020304" pitchFamily="18" charset="0"/>
+              </a:rPr>
+              <a:t>slicknav</a:t>
+            </a:r>
+            <a:r>
+              <a:rPr lang="en-US" sz="1400" b="1" dirty="0">
+                <a:highlight>
+                  <a:srgbClr val="FFFF00"/>
+                </a:highlight>
+                <a:latin typeface="Courier New" panose="02070309020205020404" pitchFamily="49" charset="0"/>
+                <a:ea typeface="Times New Roman" panose="02020603050405020304" pitchFamily="18" charset="0"/>
+                <a:cs typeface="Times New Roman" panose="02020603050405020304" pitchFamily="18" charset="0"/>
+              </a:rPr>
+              <a:t>({</a:t>
+            </a:r>
+            <a:r>
+              <a:rPr lang="en-US" sz="1400" b="1" dirty="0" err="1">
+                <a:highlight>
+                  <a:srgbClr val="FFFF00"/>
+                </a:highlight>
+                <a:latin typeface="Courier New" panose="02070309020205020404" pitchFamily="49" charset="0"/>
+                <a:ea typeface="Times New Roman" panose="02020603050405020304" pitchFamily="18" charset="0"/>
+                <a:cs typeface="Times New Roman" panose="02020603050405020304" pitchFamily="18" charset="0"/>
+              </a:rPr>
+              <a:t>prependTo</a:t>
+            </a:r>
+            <a:r>
+              <a:rPr lang="en-US" sz="1400" b="1" dirty="0">
+                <a:highlight>
+                  <a:srgbClr val="FFFF00"/>
+                </a:highlight>
+                <a:latin typeface="Courier New" panose="02070309020205020404" pitchFamily="49" charset="0"/>
+                <a:ea typeface="Times New Roman" panose="02020603050405020304" pitchFamily="18" charset="0"/>
+                <a:cs typeface="Times New Roman" panose="02020603050405020304" pitchFamily="18" charset="0"/>
+              </a:rPr>
+              <a:t>:"#</a:t>
+            </a:r>
+            <a:r>
+              <a:rPr lang="en-US" sz="1400" b="1" dirty="0" err="1">
+                <a:highlight>
+                  <a:srgbClr val="FFFF00"/>
+                </a:highlight>
+                <a:latin typeface="Courier New" panose="02070309020205020404" pitchFamily="49" charset="0"/>
+                <a:ea typeface="Times New Roman" panose="02020603050405020304" pitchFamily="18" charset="0"/>
+                <a:cs typeface="Times New Roman" panose="02020603050405020304" pitchFamily="18" charset="0"/>
+              </a:rPr>
+              <a:t>mobile_menu</a:t>
+            </a:r>
+            <a:r>
+              <a:rPr lang="en-US" sz="1400" b="1" dirty="0">
+                <a:highlight>
+                  <a:srgbClr val="FFFF00"/>
+                </a:highlight>
+                <a:latin typeface="Courier New" panose="02070309020205020404" pitchFamily="49" charset="0"/>
+                <a:ea typeface="Times New Roman" panose="02020603050405020304" pitchFamily="18" charset="0"/>
+                <a:cs typeface="Times New Roman" panose="02020603050405020304" pitchFamily="18" charset="0"/>
+              </a:rPr>
+              <a:t>"});</a:t>
+            </a:r>
+          </a:p>
+          <a:p>
+            <a:pPr marL="347345" marR="0">
+              <a:spcBef>
+                <a:spcPts val="0"/>
+              </a:spcBef>
+              <a:spcAft>
+                <a:spcPts val="0"/>
+              </a:spcAft>
+              <a:tabLst>
+                <a:tab pos="1371600" algn="l"/>
+              </a:tabLst>
+            </a:pPr>
+            <a:r>
+              <a:rPr lang="en-US" sz="1400" b="1" dirty="0">
+                <a:highlight>
+                  <a:srgbClr val="FFFFFF"/>
+                </a:highlight>
+                <a:latin typeface="Courier New" panose="02070309020205020404" pitchFamily="49" charset="0"/>
+                <a:ea typeface="Times New Roman" panose="02020603050405020304" pitchFamily="18" charset="0"/>
+                <a:cs typeface="Times New Roman" panose="02020603050405020304" pitchFamily="18" charset="0"/>
+              </a:rPr>
+              <a:t>    </a:t>
+            </a:r>
+            <a:r>
+              <a:rPr lang="en-US" sz="1400" b="1" dirty="0">
+                <a:highlight>
+                  <a:srgbClr val="FFFF00"/>
+                </a:highlight>
+                <a:latin typeface="Courier New" panose="02070309020205020404" pitchFamily="49" charset="0"/>
+                <a:ea typeface="Times New Roman" panose="02020603050405020304" pitchFamily="18" charset="0"/>
+                <a:cs typeface="Times New Roman" panose="02020603050405020304" pitchFamily="18" charset="0"/>
+              </a:rPr>
+              <a:t>});</a:t>
+            </a:r>
+          </a:p>
+          <a:p>
+            <a:pPr marL="347345" marR="0">
+              <a:spcBef>
+                <a:spcPts val="0"/>
+              </a:spcBef>
+              <a:spcAft>
+                <a:spcPts val="0"/>
+              </a:spcAft>
+              <a:tabLst>
+                <a:tab pos="1371600" algn="l"/>
+              </a:tabLst>
+            </a:pPr>
+            <a:r>
+              <a:rPr lang="en-US" sz="1400" b="1" dirty="0">
+                <a:highlight>
+                  <a:srgbClr val="FFFFFF"/>
+                </a:highlight>
+                <a:latin typeface="Courier New" panose="02070309020205020404" pitchFamily="49" charset="0"/>
+                <a:ea typeface="Times New Roman" panose="02020603050405020304" pitchFamily="18" charset="0"/>
+                <a:cs typeface="Times New Roman" panose="02020603050405020304" pitchFamily="18" charset="0"/>
+              </a:rPr>
+              <a:t>&lt;/script&gt;</a:t>
             </a:r>
             <a:endParaRPr lang="en-US" sz="1400" b="1" dirty="0">
               <a:latin typeface="Courier New" panose="02070309020205020404" pitchFamily="49" charset="0"/>
@@ -14910,182 +15103,40 @@
             </a:endParaRPr>
           </a:p>
           <a:p>
-            <a:pPr marL="347345" marR="0">
-              <a:spcBef>
-                <a:spcPts val="0"/>
-              </a:spcBef>
-              <a:spcAft>
-                <a:spcPts val="0"/>
-              </a:spcAft>
-              <a:tabLst>
-                <a:tab pos="1371600" algn="l"/>
-              </a:tabLst>
-            </a:pPr>
-            <a:r>
-              <a:rPr lang="en-US" sz="1400" b="1" dirty="0">
-                <a:highlight>
-                  <a:srgbClr val="FFFFFF"/>
-                </a:highlight>
-                <a:latin typeface="Courier New" panose="02070309020205020404" pitchFamily="49" charset="0"/>
-                <a:ea typeface="Times New Roman" panose="02020603050405020304" pitchFamily="18" charset="0"/>
-                <a:cs typeface="Times New Roman" panose="02020603050405020304" pitchFamily="18" charset="0"/>
-              </a:rPr>
-              <a:t>        $('#</a:t>
-            </a:r>
-            <a:r>
-              <a:rPr lang="en-US" sz="1400" b="1" dirty="0" err="1">
-                <a:highlight>
-                  <a:srgbClr val="FFFFFF"/>
-                </a:highlight>
-                <a:latin typeface="Courier New" panose="02070309020205020404" pitchFamily="49" charset="0"/>
-                <a:ea typeface="Times New Roman" panose="02020603050405020304" pitchFamily="18" charset="0"/>
-                <a:cs typeface="Times New Roman" panose="02020603050405020304" pitchFamily="18" charset="0"/>
-              </a:rPr>
-              <a:t>nav_menu</a:t>
-            </a:r>
-            <a:r>
-              <a:rPr lang="en-US" sz="1400" b="1" dirty="0">
-                <a:highlight>
-                  <a:srgbClr val="FFFFFF"/>
-                </a:highlight>
-                <a:latin typeface="Courier New" panose="02070309020205020404" pitchFamily="49" charset="0"/>
-                <a:ea typeface="Times New Roman" panose="02020603050405020304" pitchFamily="18" charset="0"/>
-                <a:cs typeface="Times New Roman" panose="02020603050405020304" pitchFamily="18" charset="0"/>
-              </a:rPr>
-              <a:t>').</a:t>
-            </a:r>
-            <a:r>
-              <a:rPr lang="en-US" sz="1400" b="1" dirty="0" err="1">
-                <a:highlight>
-                  <a:srgbClr val="FFFFFF"/>
-                </a:highlight>
-                <a:latin typeface="Courier New" panose="02070309020205020404" pitchFamily="49" charset="0"/>
-                <a:ea typeface="Times New Roman" panose="02020603050405020304" pitchFamily="18" charset="0"/>
-                <a:cs typeface="Times New Roman" panose="02020603050405020304" pitchFamily="18" charset="0"/>
-              </a:rPr>
-              <a:t>slicknav</a:t>
-            </a:r>
-            <a:r>
-              <a:rPr lang="en-US" sz="1400" b="1" dirty="0">
-                <a:highlight>
-                  <a:srgbClr val="FFFFFF"/>
-                </a:highlight>
-                <a:latin typeface="Courier New" panose="02070309020205020404" pitchFamily="49" charset="0"/>
-                <a:ea typeface="Times New Roman" panose="02020603050405020304" pitchFamily="18" charset="0"/>
-                <a:cs typeface="Times New Roman" panose="02020603050405020304" pitchFamily="18" charset="0"/>
-              </a:rPr>
-              <a:t>({</a:t>
-            </a:r>
-            <a:r>
-              <a:rPr lang="en-US" sz="1400" b="1" dirty="0" err="1">
-                <a:highlight>
-                  <a:srgbClr val="FFFFFF"/>
-                </a:highlight>
-                <a:latin typeface="Courier New" panose="02070309020205020404" pitchFamily="49" charset="0"/>
-                <a:ea typeface="Times New Roman" panose="02020603050405020304" pitchFamily="18" charset="0"/>
-                <a:cs typeface="Times New Roman" panose="02020603050405020304" pitchFamily="18" charset="0"/>
-              </a:rPr>
-              <a:t>prependTo</a:t>
-            </a:r>
-            <a:r>
-              <a:rPr lang="en-US" sz="1400" b="1" dirty="0">
-                <a:highlight>
-                  <a:srgbClr val="FFFFFF"/>
-                </a:highlight>
-                <a:latin typeface="Courier New" panose="02070309020205020404" pitchFamily="49" charset="0"/>
-                <a:ea typeface="Times New Roman" panose="02020603050405020304" pitchFamily="18" charset="0"/>
-                <a:cs typeface="Times New Roman" panose="02020603050405020304" pitchFamily="18" charset="0"/>
-              </a:rPr>
-              <a:t>:"#</a:t>
-            </a:r>
-            <a:r>
-              <a:rPr lang="en-US" sz="1400" b="1" dirty="0" err="1">
-                <a:highlight>
-                  <a:srgbClr val="FFFFFF"/>
-                </a:highlight>
-                <a:latin typeface="Courier New" panose="02070309020205020404" pitchFamily="49" charset="0"/>
-                <a:ea typeface="Times New Roman" panose="02020603050405020304" pitchFamily="18" charset="0"/>
-                <a:cs typeface="Times New Roman" panose="02020603050405020304" pitchFamily="18" charset="0"/>
-              </a:rPr>
-              <a:t>mobile_menu</a:t>
-            </a:r>
-            <a:r>
-              <a:rPr lang="en-US" sz="1400" b="1" dirty="0">
-                <a:highlight>
-                  <a:srgbClr val="FFFFFF"/>
-                </a:highlight>
-                <a:latin typeface="Courier New" panose="02070309020205020404" pitchFamily="49" charset="0"/>
-                <a:ea typeface="Times New Roman" panose="02020603050405020304" pitchFamily="18" charset="0"/>
-                <a:cs typeface="Times New Roman" panose="02020603050405020304" pitchFamily="18" charset="0"/>
-              </a:rPr>
-              <a:t>"});</a:t>
-            </a:r>
-            <a:endParaRPr lang="en-US" sz="1400" b="1" dirty="0">
-              <a:latin typeface="Courier New" panose="02070309020205020404" pitchFamily="49" charset="0"/>
-              <a:ea typeface="Times New Roman" panose="02020603050405020304" pitchFamily="18" charset="0"/>
-              <a:cs typeface="Times New Roman" panose="02020603050405020304" pitchFamily="18" charset="0"/>
-            </a:endParaRPr>
-          </a:p>
-          <a:p>
-            <a:pPr marL="347345" marR="0">
-              <a:spcBef>
-                <a:spcPts val="0"/>
-              </a:spcBef>
-              <a:spcAft>
-                <a:spcPts val="0"/>
-              </a:spcAft>
-              <a:tabLst>
-                <a:tab pos="1371600" algn="l"/>
-              </a:tabLst>
-            </a:pPr>
-            <a:r>
-              <a:rPr lang="en-US" sz="1400" b="1" dirty="0">
-                <a:highlight>
-                  <a:srgbClr val="FFFFFF"/>
-                </a:highlight>
-                <a:latin typeface="Courier New" panose="02070309020205020404" pitchFamily="49" charset="0"/>
-                <a:ea typeface="Times New Roman" panose="02020603050405020304" pitchFamily="18" charset="0"/>
-                <a:cs typeface="Times New Roman" panose="02020603050405020304" pitchFamily="18" charset="0"/>
-              </a:rPr>
-              <a:t>    });</a:t>
-            </a:r>
-            <a:endParaRPr lang="en-US" sz="1400" b="1" dirty="0">
-              <a:latin typeface="Courier New" panose="02070309020205020404" pitchFamily="49" charset="0"/>
-              <a:ea typeface="Times New Roman" panose="02020603050405020304" pitchFamily="18" charset="0"/>
-              <a:cs typeface="Times New Roman" panose="02020603050405020304" pitchFamily="18" charset="0"/>
-            </a:endParaRPr>
-          </a:p>
-          <a:p>
-            <a:pPr marL="347345" marR="0">
-              <a:spcBef>
-                <a:spcPts val="0"/>
-              </a:spcBef>
-              <a:spcAft>
-                <a:spcPts val="0"/>
-              </a:spcAft>
-              <a:tabLst>
-                <a:tab pos="1371600" algn="l"/>
-              </a:tabLst>
-            </a:pPr>
-            <a:r>
-              <a:rPr lang="en-US" sz="1400" b="1" dirty="0">
-                <a:highlight>
-                  <a:srgbClr val="FFFFFF"/>
-                </a:highlight>
-                <a:latin typeface="Courier New" panose="02070309020205020404" pitchFamily="49" charset="0"/>
-                <a:ea typeface="Times New Roman" panose="02020603050405020304" pitchFamily="18" charset="0"/>
-                <a:cs typeface="Times New Roman" panose="02020603050405020304" pitchFamily="18" charset="0"/>
-              </a:rPr>
-              <a:t>&lt;/script&gt;</a:t>
-            </a:r>
-            <a:endParaRPr lang="en-US" sz="1400" b="1" dirty="0">
-              <a:latin typeface="Courier New" panose="02070309020205020404" pitchFamily="49" charset="0"/>
-              <a:ea typeface="Times New Roman" panose="02020603050405020304" pitchFamily="18" charset="0"/>
-              <a:cs typeface="Times New Roman" panose="02020603050405020304" pitchFamily="18" charset="0"/>
-            </a:endParaRPr>
-          </a:p>
-          <a:p>
-            <a:endParaRPr lang="en-US" dirty="0"/>
+            <a:r>
+              <a:rPr lang="en-US" sz="1600" dirty="0">
+                <a:highlight>
+                  <a:srgbClr val="FFFF00"/>
+                </a:highlight>
+              </a:rPr>
+              <a:t>Get the newest version of jQuery from </a:t>
+            </a:r>
+            <a:r>
+              <a:rPr lang="en-US" sz="1600" dirty="0">
+                <a:solidFill>
+                  <a:srgbClr val="0070C0"/>
+                </a:solidFill>
+                <a:highlight>
+                  <a:srgbClr val="FFFF00"/>
+                </a:highlight>
+                <a:hlinkClick r:id="rId3">
+                  <a:extLst>
+                    <a:ext uri="{A12FA001-AC4F-418D-AE19-62706E023703}">
+                      <ahyp:hlinkClr xmlns:ahyp="http://schemas.microsoft.com/office/drawing/2018/hyperlinkcolor" val="tx"/>
+                    </a:ext>
+                  </a:extLst>
+                </a:hlinkClick>
+              </a:rPr>
+              <a:t>https://code.jquery.com/</a:t>
+            </a:r>
+            <a:endParaRPr lang="en-US" sz="1600" dirty="0">
+              <a:solidFill>
+                <a:srgbClr val="0070C0"/>
+              </a:solidFill>
+              <a:highlight>
+                <a:srgbClr val="FFFF00"/>
+              </a:highlight>
+            </a:endParaRPr>
           </a:p>
         </p:txBody>
       </p:sp>

</xml_diff>